<commit_message>
0807update - exp about var thickness and data/errorbar
</commit_message>
<xml_diff>
--- a/lab_log0806.pptx
+++ b/lab_log0806.pptx
@@ -15,7 +15,8 @@
     <p:sldId id="261" r:id="rId9"/>
     <p:sldId id="264" r:id="rId10"/>
     <p:sldId id="265" r:id="rId11"/>
-    <p:sldId id="266" r:id="rId12"/>
+    <p:sldId id="267" r:id="rId12"/>
+    <p:sldId id="266" r:id="rId13"/>
   </p:sldIdLst>
   <p:sldSz cx="12192000" cy="6858000"/>
   <p:notesSz cx="6858000" cy="9144000"/>
@@ -125,7 +126,7 @@
 <file path=ppt/revisionInfo.xml><?xml version="1.0" encoding="utf-8"?>
 <p1510:revInfo xmlns:a="http://schemas.openxmlformats.org/drawingml/2006/main" xmlns:r="http://schemas.openxmlformats.org/officeDocument/2006/relationships" xmlns:p1510="http://schemas.microsoft.com/office/powerpoint/2015/10/main">
   <p1510:revLst>
-    <p1510:client id="{A305CB3F-F413-43C7-9799-9F4D42D12FAC}" v="13" dt="2024-08-06T08:11:45.308"/>
+    <p1510:client id="{A305CB3F-F413-43C7-9799-9F4D42D12FAC}" v="25" dt="2024-08-07T07:32:02.443"/>
   </p1510:revLst>
 </p1510:revInfo>
 </file>
@@ -134,13 +135,13 @@
 <pc:chgInfo xmlns:a="http://schemas.openxmlformats.org/drawingml/2006/main" xmlns:r="http://schemas.openxmlformats.org/officeDocument/2006/relationships" xmlns:ac="http://schemas.microsoft.com/office/drawing/2013/main/command" xmlns:pc="http://schemas.microsoft.com/office/powerpoint/2013/main/command">
   <pc:docChgLst>
     <pc:chgData name="민서 오" userId="7d89e7b822021c56" providerId="LiveId" clId="{A305CB3F-F413-43C7-9799-9F4D42D12FAC}"/>
-    <pc:docChg chg="undo custSel addSld modSld">
-      <pc:chgData name="민서 오" userId="7d89e7b822021c56" providerId="LiveId" clId="{A305CB3F-F413-43C7-9799-9F4D42D12FAC}" dt="2024-08-06T08:11:45.308" v="184"/>
+    <pc:docChg chg="undo custSel addSld modSld sldOrd">
+      <pc:chgData name="민서 오" userId="7d89e7b822021c56" providerId="LiveId" clId="{A305CB3F-F413-43C7-9799-9F4D42D12FAC}" dt="2024-08-07T07:32:18.296" v="253" actId="14100"/>
       <pc:docMkLst>
         <pc:docMk/>
       </pc:docMkLst>
       <pc:sldChg chg="addSp delSp modSp new mod">
-        <pc:chgData name="민서 오" userId="7d89e7b822021c56" providerId="LiveId" clId="{A305CB3F-F413-43C7-9799-9F4D42D12FAC}" dt="2024-08-06T08:02:56.602" v="133" actId="1076"/>
+        <pc:chgData name="민서 오" userId="7d89e7b822021c56" providerId="LiveId" clId="{A305CB3F-F413-43C7-9799-9F4D42D12FAC}" dt="2024-08-07T07:03:09.093" v="233"/>
         <pc:sldMkLst>
           <pc:docMk/>
           <pc:sldMk cId="673990641" sldId="264"/>
@@ -169,6 +170,14 @@
             <ac:spMk id="8" creationId="{DA61CA4A-AB2A-C92E-CD33-C105F4C92C03}"/>
           </ac:spMkLst>
         </pc:spChg>
+        <pc:picChg chg="add mod">
+          <ac:chgData name="민서 오" userId="7d89e7b822021c56" providerId="LiveId" clId="{A305CB3F-F413-43C7-9799-9F4D42D12FAC}" dt="2024-08-07T07:03:09.093" v="233"/>
+          <ac:picMkLst>
+            <pc:docMk/>
+            <pc:sldMk cId="673990641" sldId="264"/>
+            <ac:picMk id="3" creationId="{FACE8C37-43EB-84F4-DEE9-5A29DC2E04F8}"/>
+          </ac:picMkLst>
+        </pc:picChg>
         <pc:picChg chg="add del mod">
           <ac:chgData name="민서 오" userId="7d89e7b822021c56" providerId="LiveId" clId="{A305CB3F-F413-43C7-9799-9F4D42D12FAC}" dt="2024-08-06T08:00:53.628" v="129" actId="478"/>
           <ac:picMkLst>
@@ -186,7 +195,7 @@
           </ac:picMkLst>
         </pc:picChg>
         <pc:picChg chg="add mod">
-          <ac:chgData name="민서 오" userId="7d89e7b822021c56" providerId="LiveId" clId="{A305CB3F-F413-43C7-9799-9F4D42D12FAC}" dt="2024-08-06T08:02:56.602" v="133" actId="1076"/>
+          <ac:chgData name="민서 오" userId="7d89e7b822021c56" providerId="LiveId" clId="{A305CB3F-F413-43C7-9799-9F4D42D12FAC}" dt="2024-08-07T06:53:42.339" v="225" actId="1076"/>
           <ac:picMkLst>
             <pc:docMk/>
             <pc:sldMk cId="673990641" sldId="264"/>
@@ -195,7 +204,7 @@
         </pc:picChg>
       </pc:sldChg>
       <pc:sldChg chg="addSp delSp modSp new mod">
-        <pc:chgData name="민서 오" userId="7d89e7b822021c56" providerId="LiveId" clId="{A305CB3F-F413-43C7-9799-9F4D42D12FAC}" dt="2024-08-06T08:11:45.308" v="184"/>
+        <pc:chgData name="민서 오" userId="7d89e7b822021c56" providerId="LiveId" clId="{A305CB3F-F413-43C7-9799-9F4D42D12FAC}" dt="2024-08-07T07:03:19.433" v="238" actId="1076"/>
         <pc:sldMkLst>
           <pc:docMk/>
           <pc:sldMk cId="37500532" sldId="265"/>
@@ -208,6 +217,14 @@
             <ac:spMk id="2" creationId="{4BE39211-3C24-C39F-4205-B734869EEA65}"/>
           </ac:spMkLst>
         </pc:spChg>
+        <pc:spChg chg="add mod">
+          <ac:chgData name="민서 오" userId="7d89e7b822021c56" providerId="LiveId" clId="{A305CB3F-F413-43C7-9799-9F4D42D12FAC}" dt="2024-08-07T06:52:02.008" v="194" actId="20577"/>
+          <ac:spMkLst>
+            <pc:docMk/>
+            <pc:sldMk cId="37500532" sldId="265"/>
+            <ac:spMk id="2" creationId="{61FCAC99-8559-EFE4-240C-B2AA4B2ABEEC}"/>
+          </ac:spMkLst>
+        </pc:spChg>
         <pc:spChg chg="del">
           <ac:chgData name="민서 오" userId="7d89e7b822021c56" providerId="LiveId" clId="{A305CB3F-F413-43C7-9799-9F4D42D12FAC}" dt="2024-08-06T07:52:54.963" v="5" actId="478"/>
           <ac:spMkLst>
@@ -216,8 +233,8 @@
             <ac:spMk id="3" creationId="{3D8BAA1B-2F6C-4374-DCFE-20BD113B33F2}"/>
           </ac:spMkLst>
         </pc:spChg>
-        <pc:spChg chg="add mod">
-          <ac:chgData name="민서 오" userId="7d89e7b822021c56" providerId="LiveId" clId="{A305CB3F-F413-43C7-9799-9F4D42D12FAC}" dt="2024-08-06T08:07:59.168" v="174" actId="20577"/>
+        <pc:spChg chg="add del mod">
+          <ac:chgData name="민서 오" userId="7d89e7b822021c56" providerId="LiveId" clId="{A305CB3F-F413-43C7-9799-9F4D42D12FAC}" dt="2024-08-07T06:51:58.306" v="189" actId="478"/>
           <ac:spMkLst>
             <pc:docMk/>
             <pc:sldMk cId="37500532" sldId="265"/>
@@ -233,11 +250,27 @@
           </ac:graphicFrameMkLst>
         </pc:graphicFrameChg>
         <pc:picChg chg="add del mod">
+          <ac:chgData name="민서 오" userId="7d89e7b822021c56" providerId="LiveId" clId="{A305CB3F-F413-43C7-9799-9F4D42D12FAC}" dt="2024-08-07T06:57:41.574" v="228" actId="478"/>
+          <ac:picMkLst>
+            <pc:docMk/>
+            <pc:sldMk cId="37500532" sldId="265"/>
+            <ac:picMk id="4" creationId="{84255D8F-1B63-1272-7014-21B460012430}"/>
+          </ac:picMkLst>
+        </pc:picChg>
+        <pc:picChg chg="add del mod">
           <ac:chgData name="민서 오" userId="7d89e7b822021c56" providerId="LiveId" clId="{A305CB3F-F413-43C7-9799-9F4D42D12FAC}" dt="2024-08-06T08:00:52.412" v="128" actId="478"/>
           <ac:picMkLst>
             <pc:docMk/>
             <pc:sldMk cId="37500532" sldId="265"/>
             <ac:picMk id="5" creationId="{DDE9B052-5265-A322-05FF-848A2695BC0E}"/>
+          </ac:picMkLst>
+        </pc:picChg>
+        <pc:picChg chg="add mod">
+          <ac:chgData name="민서 오" userId="7d89e7b822021c56" providerId="LiveId" clId="{A305CB3F-F413-43C7-9799-9F4D42D12FAC}" dt="2024-08-07T07:03:19.433" v="238" actId="1076"/>
+          <ac:picMkLst>
+            <pc:docMk/>
+            <pc:sldMk cId="37500532" sldId="265"/>
+            <ac:picMk id="6" creationId="{DEA427F9-C073-3CE3-FD45-4894C7EE35AF}"/>
           </ac:picMkLst>
         </pc:picChg>
         <pc:picChg chg="add del mod">
@@ -248,16 +281,16 @@
             <ac:picMk id="7" creationId="{BD76D302-E2E1-C8F0-557B-EB3A35208771}"/>
           </ac:picMkLst>
         </pc:picChg>
-        <pc:picChg chg="add mod">
-          <ac:chgData name="민서 오" userId="7d89e7b822021c56" providerId="LiveId" clId="{A305CB3F-F413-43C7-9799-9F4D42D12FAC}" dt="2024-08-06T08:03:20.116" v="146" actId="1076"/>
+        <pc:picChg chg="add del mod">
+          <ac:chgData name="민서 오" userId="7d89e7b822021c56" providerId="LiveId" clId="{A305CB3F-F413-43C7-9799-9F4D42D12FAC}" dt="2024-08-07T06:51:45.547" v="185" actId="478"/>
           <ac:picMkLst>
             <pc:docMk/>
             <pc:sldMk cId="37500532" sldId="265"/>
             <ac:picMk id="10" creationId="{C27C26FA-A37A-D506-9BA3-CEE37BA6691C}"/>
           </ac:picMkLst>
         </pc:picChg>
-        <pc:picChg chg="add mod">
-          <ac:chgData name="민서 오" userId="7d89e7b822021c56" providerId="LiveId" clId="{A305CB3F-F413-43C7-9799-9F4D42D12FAC}" dt="2024-08-06T08:11:38.695" v="179" actId="1076"/>
+        <pc:picChg chg="add del mod">
+          <ac:chgData name="민서 오" userId="7d89e7b822021c56" providerId="LiveId" clId="{A305CB3F-F413-43C7-9799-9F4D42D12FAC}" dt="2024-08-07T06:51:47.022" v="186" actId="478"/>
           <ac:picMkLst>
             <pc:docMk/>
             <pc:sldMk cId="37500532" sldId="265"/>
@@ -265,12 +298,20 @@
           </ac:picMkLst>
         </pc:picChg>
       </pc:sldChg>
-      <pc:sldChg chg="delSp new mod">
-        <pc:chgData name="민서 오" userId="7d89e7b822021c56" providerId="LiveId" clId="{A305CB3F-F413-43C7-9799-9F4D42D12FAC}" dt="2024-08-06T07:52:51.418" v="4" actId="478"/>
+      <pc:sldChg chg="addSp delSp modSp new mod ord">
+        <pc:chgData name="민서 오" userId="7d89e7b822021c56" providerId="LiveId" clId="{A305CB3F-F413-43C7-9799-9F4D42D12FAC}" dt="2024-08-07T07:32:18.296" v="253" actId="14100"/>
         <pc:sldMkLst>
           <pc:docMk/>
           <pc:sldMk cId="2739686958" sldId="266"/>
         </pc:sldMkLst>
+        <pc:spChg chg="add mod">
+          <ac:chgData name="민서 오" userId="7d89e7b822021c56" providerId="LiveId" clId="{A305CB3F-F413-43C7-9799-9F4D42D12FAC}" dt="2024-08-07T06:52:32.103" v="209" actId="20577"/>
+          <ac:spMkLst>
+            <pc:docMk/>
+            <pc:sldMk cId="2739686958" sldId="266"/>
+            <ac:spMk id="2" creationId="{79D497B1-52CA-BEE2-76AC-7833AF082841}"/>
+          </ac:spMkLst>
+        </pc:spChg>
         <pc:spChg chg="del">
           <ac:chgData name="민서 오" userId="7d89e7b822021c56" providerId="LiveId" clId="{A305CB3F-F413-43C7-9799-9F4D42D12FAC}" dt="2024-08-06T07:52:50.844" v="3" actId="478"/>
           <ac:spMkLst>
@@ -287,6 +328,85 @@
             <ac:spMk id="3" creationId="{79137F13-157F-086A-9B21-1B8F47C12847}"/>
           </ac:spMkLst>
         </pc:spChg>
+        <pc:spChg chg="add mod">
+          <ac:chgData name="민서 오" userId="7d89e7b822021c56" providerId="LiveId" clId="{A305CB3F-F413-43C7-9799-9F4D42D12FAC}" dt="2024-08-07T07:32:18.296" v="253" actId="14100"/>
+          <ac:spMkLst>
+            <pc:docMk/>
+            <pc:sldMk cId="2739686958" sldId="266"/>
+            <ac:spMk id="5" creationId="{B5F75FE4-35F7-4DF7-BAC8-6EC536A46805}"/>
+          </ac:spMkLst>
+        </pc:spChg>
+        <pc:spChg chg="add del mod">
+          <ac:chgData name="민서 오" userId="7d89e7b822021c56" providerId="LiveId" clId="{A305CB3F-F413-43C7-9799-9F4D42D12FAC}" dt="2024-08-07T07:32:08.960" v="252" actId="478"/>
+          <ac:spMkLst>
+            <pc:docMk/>
+            <pc:sldMk cId="2739686958" sldId="266"/>
+            <ac:spMk id="6" creationId="{3A985F11-1906-AFAF-5CE3-0E5AB87693C8}"/>
+          </ac:spMkLst>
+        </pc:spChg>
+        <pc:picChg chg="add mod">
+          <ac:chgData name="민서 오" userId="7d89e7b822021c56" providerId="LiveId" clId="{A305CB3F-F413-43C7-9799-9F4D42D12FAC}" dt="2024-08-07T06:53:30.634" v="220" actId="1076"/>
+          <ac:picMkLst>
+            <pc:docMk/>
+            <pc:sldMk cId="2739686958" sldId="266"/>
+            <ac:picMk id="4" creationId="{D81EA3B9-D301-F1F5-C464-A864C0C7D949}"/>
+          </ac:picMkLst>
+        </pc:picChg>
+      </pc:sldChg>
+      <pc:sldChg chg="addSp delSp modSp new mod">
+        <pc:chgData name="민서 오" userId="7d89e7b822021c56" providerId="LiveId" clId="{A305CB3F-F413-43C7-9799-9F4D42D12FAC}" dt="2024-08-07T07:05:25.860" v="247"/>
+        <pc:sldMkLst>
+          <pc:docMk/>
+          <pc:sldMk cId="3281594670" sldId="267"/>
+        </pc:sldMkLst>
+        <pc:spChg chg="del">
+          <ac:chgData name="민서 오" userId="7d89e7b822021c56" providerId="LiveId" clId="{A305CB3F-F413-43C7-9799-9F4D42D12FAC}" dt="2024-08-07T06:52:25.384" v="202" actId="478"/>
+          <ac:spMkLst>
+            <pc:docMk/>
+            <pc:sldMk cId="3281594670" sldId="267"/>
+            <ac:spMk id="2" creationId="{03F4BB88-6288-3571-C418-5E404EA5D900}"/>
+          </ac:spMkLst>
+        </pc:spChg>
+        <pc:spChg chg="del">
+          <ac:chgData name="민서 오" userId="7d89e7b822021c56" providerId="LiveId" clId="{A305CB3F-F413-43C7-9799-9F4D42D12FAC}" dt="2024-08-07T06:52:25.384" v="202" actId="478"/>
+          <ac:spMkLst>
+            <pc:docMk/>
+            <pc:sldMk cId="3281594670" sldId="267"/>
+            <ac:spMk id="3" creationId="{4CA7BCEA-91DD-68C1-37C3-BD5F1C696F7B}"/>
+          </ac:spMkLst>
+        </pc:spChg>
+        <pc:spChg chg="add mod">
+          <ac:chgData name="민서 오" userId="7d89e7b822021c56" providerId="LiveId" clId="{A305CB3F-F413-43C7-9799-9F4D42D12FAC}" dt="2024-08-07T06:52:29.628" v="205" actId="20577"/>
+          <ac:spMkLst>
+            <pc:docMk/>
+            <pc:sldMk cId="3281594670" sldId="267"/>
+            <ac:spMk id="4" creationId="{3B092B35-58A6-8C07-03C0-9279B1D20F0D}"/>
+          </ac:spMkLst>
+        </pc:spChg>
+        <pc:spChg chg="add mod">
+          <ac:chgData name="민서 오" userId="7d89e7b822021c56" providerId="LiveId" clId="{A305CB3F-F413-43C7-9799-9F4D42D12FAC}" dt="2024-08-07T07:05:11.711" v="244" actId="14100"/>
+          <ac:spMkLst>
+            <pc:docMk/>
+            <pc:sldMk cId="3281594670" sldId="267"/>
+            <ac:spMk id="7" creationId="{9D9234D5-BAAE-A6D5-6300-98EBF1A6F586}"/>
+          </ac:spMkLst>
+        </pc:spChg>
+        <pc:spChg chg="add del mod">
+          <ac:chgData name="민서 오" userId="7d89e7b822021c56" providerId="LiveId" clId="{A305CB3F-F413-43C7-9799-9F4D42D12FAC}" dt="2024-08-07T07:05:25.860" v="247"/>
+          <ac:spMkLst>
+            <pc:docMk/>
+            <pc:sldMk cId="3281594670" sldId="267"/>
+            <ac:spMk id="8" creationId="{68577798-0CD7-63CD-CABB-10E797BFE79C}"/>
+          </ac:spMkLst>
+        </pc:spChg>
+        <pc:picChg chg="add mod">
+          <ac:chgData name="민서 오" userId="7d89e7b822021c56" providerId="LiveId" clId="{A305CB3F-F413-43C7-9799-9F4D42D12FAC}" dt="2024-08-07T06:53:27.577" v="219" actId="1076"/>
+          <ac:picMkLst>
+            <pc:docMk/>
+            <pc:sldMk cId="3281594670" sldId="267"/>
+            <ac:picMk id="6" creationId="{00F570A8-EDB2-7708-2761-10CEE381AAF8}"/>
+          </ac:picMkLst>
+        </pc:picChg>
       </pc:sldChg>
     </pc:docChg>
   </pc:docChgLst>
@@ -440,7 +560,7 @@
           <a:p>
             <a:fld id="{843012E4-EA86-4BA1-A56C-00CD16D7F17B}" type="datetimeFigureOut">
               <a:rPr lang="ko-KR" altLang="en-US" smtClean="0"/>
-              <a:t>2024-08-06</a:t>
+              <a:t>2024-08-07</a:t>
             </a:fld>
             <a:endParaRPr lang="ko-KR" altLang="en-US"/>
           </a:p>
@@ -638,7 +758,7 @@
           <a:p>
             <a:fld id="{843012E4-EA86-4BA1-A56C-00CD16D7F17B}" type="datetimeFigureOut">
               <a:rPr lang="ko-KR" altLang="en-US" smtClean="0"/>
-              <a:t>2024-08-06</a:t>
+              <a:t>2024-08-07</a:t>
             </a:fld>
             <a:endParaRPr lang="ko-KR" altLang="en-US"/>
           </a:p>
@@ -846,7 +966,7 @@
           <a:p>
             <a:fld id="{843012E4-EA86-4BA1-A56C-00CD16D7F17B}" type="datetimeFigureOut">
               <a:rPr lang="ko-KR" altLang="en-US" smtClean="0"/>
-              <a:t>2024-08-06</a:t>
+              <a:t>2024-08-07</a:t>
             </a:fld>
             <a:endParaRPr lang="ko-KR" altLang="en-US"/>
           </a:p>
@@ -1044,7 +1164,7 @@
           <a:p>
             <a:fld id="{843012E4-EA86-4BA1-A56C-00CD16D7F17B}" type="datetimeFigureOut">
               <a:rPr lang="ko-KR" altLang="en-US" smtClean="0"/>
-              <a:t>2024-08-06</a:t>
+              <a:t>2024-08-07</a:t>
             </a:fld>
             <a:endParaRPr lang="ko-KR" altLang="en-US"/>
           </a:p>
@@ -1319,7 +1439,7 @@
           <a:p>
             <a:fld id="{843012E4-EA86-4BA1-A56C-00CD16D7F17B}" type="datetimeFigureOut">
               <a:rPr lang="ko-KR" altLang="en-US" smtClean="0"/>
-              <a:t>2024-08-06</a:t>
+              <a:t>2024-08-07</a:t>
             </a:fld>
             <a:endParaRPr lang="ko-KR" altLang="en-US"/>
           </a:p>
@@ -1584,7 +1704,7 @@
           <a:p>
             <a:fld id="{843012E4-EA86-4BA1-A56C-00CD16D7F17B}" type="datetimeFigureOut">
               <a:rPr lang="ko-KR" altLang="en-US" smtClean="0"/>
-              <a:t>2024-08-06</a:t>
+              <a:t>2024-08-07</a:t>
             </a:fld>
             <a:endParaRPr lang="ko-KR" altLang="en-US"/>
           </a:p>
@@ -1996,7 +2116,7 @@
           <a:p>
             <a:fld id="{843012E4-EA86-4BA1-A56C-00CD16D7F17B}" type="datetimeFigureOut">
               <a:rPr lang="ko-KR" altLang="en-US" smtClean="0"/>
-              <a:t>2024-08-06</a:t>
+              <a:t>2024-08-07</a:t>
             </a:fld>
             <a:endParaRPr lang="ko-KR" altLang="en-US"/>
           </a:p>
@@ -2137,7 +2257,7 @@
           <a:p>
             <a:fld id="{843012E4-EA86-4BA1-A56C-00CD16D7F17B}" type="datetimeFigureOut">
               <a:rPr lang="ko-KR" altLang="en-US" smtClean="0"/>
-              <a:t>2024-08-06</a:t>
+              <a:t>2024-08-07</a:t>
             </a:fld>
             <a:endParaRPr lang="ko-KR" altLang="en-US"/>
           </a:p>
@@ -2250,7 +2370,7 @@
           <a:p>
             <a:fld id="{843012E4-EA86-4BA1-A56C-00CD16D7F17B}" type="datetimeFigureOut">
               <a:rPr lang="ko-KR" altLang="en-US" smtClean="0"/>
-              <a:t>2024-08-06</a:t>
+              <a:t>2024-08-07</a:t>
             </a:fld>
             <a:endParaRPr lang="ko-KR" altLang="en-US"/>
           </a:p>
@@ -2561,7 +2681,7 @@
           <a:p>
             <a:fld id="{843012E4-EA86-4BA1-A56C-00CD16D7F17B}" type="datetimeFigureOut">
               <a:rPr lang="ko-KR" altLang="en-US" smtClean="0"/>
-              <a:t>2024-08-06</a:t>
+              <a:t>2024-08-07</a:t>
             </a:fld>
             <a:endParaRPr lang="ko-KR" altLang="en-US"/>
           </a:p>
@@ -2849,7 +2969,7 @@
           <a:p>
             <a:fld id="{843012E4-EA86-4BA1-A56C-00CD16D7F17B}" type="datetimeFigureOut">
               <a:rPr lang="ko-KR" altLang="en-US" smtClean="0"/>
-              <a:t>2024-08-06</a:t>
+              <a:t>2024-08-07</a:t>
             </a:fld>
             <a:endParaRPr lang="ko-KR" altLang="en-US"/>
           </a:p>
@@ -3090,7 +3210,7 @@
           <a:p>
             <a:fld id="{843012E4-EA86-4BA1-A56C-00CD16D7F17B}" type="datetimeFigureOut">
               <a:rPr lang="ko-KR" altLang="en-US" smtClean="0"/>
-              <a:t>2024-08-06</a:t>
+              <a:t>2024-08-07</a:t>
             </a:fld>
             <a:endParaRPr lang="ko-KR" altLang="en-US"/>
           </a:p>
@@ -4260,10 +4380,10 @@
       </p:grpSpPr>
       <p:sp>
         <p:nvSpPr>
-          <p:cNvPr id="8" name="TextBox 7">
-            <a:extLst>
-              <a:ext uri="{FF2B5EF4-FFF2-40B4-BE49-F238E27FC236}">
-                <a16:creationId xmlns:a16="http://schemas.microsoft.com/office/drawing/2014/main" id="{240F968F-E7E9-7987-5B83-78095F5852F9}"/>
+          <p:cNvPr id="2" name="TextBox 1">
+            <a:extLst>
+              <a:ext uri="{FF2B5EF4-FFF2-40B4-BE49-F238E27FC236}">
+                <a16:creationId xmlns:a16="http://schemas.microsoft.com/office/drawing/2014/main" id="{61FCAC99-8559-EFE4-240C-B2AA4B2ABEEC}"/>
               </a:ext>
             </a:extLst>
           </p:cNvPr>
@@ -4272,8 +4392,8 @@
         </p:nvSpPr>
         <p:spPr>
           <a:xfrm>
-            <a:off x="1887059" y="540774"/>
-            <a:ext cx="8408264" cy="1569660"/>
+            <a:off x="1887059" y="127819"/>
+            <a:ext cx="8408264" cy="830997"/>
           </a:xfrm>
           <a:prstGeom prst="rect">
             <a:avLst/>
@@ -4315,24 +4435,14 @@
               <a:t>thickness</a:t>
             </a:r>
           </a:p>
-          <a:p>
-            <a:r>
-              <a:rPr lang="en-US" altLang="ko-KR" sz="4800" b="1" dirty="0">
-                <a:solidFill>
-                  <a:srgbClr val="FF0000"/>
-                </a:solidFill>
-              </a:rPr>
-              <a:t>0.5mm exp needed</a:t>
-            </a:r>
-          </a:p>
         </p:txBody>
       </p:sp>
       <p:pic>
         <p:nvPicPr>
-          <p:cNvPr id="10" name="그림 9" descr="라인, 도표, 그래프, 텍스트이(가) 표시된 사진&#10;&#10;자동 생성된 설명">
-            <a:extLst>
-              <a:ext uri="{FF2B5EF4-FFF2-40B4-BE49-F238E27FC236}">
-                <a16:creationId xmlns:a16="http://schemas.microsoft.com/office/drawing/2014/main" id="{C27C26FA-A37A-D506-9BA3-CEE37BA6691C}"/>
+          <p:cNvPr id="6" name="그림 5" descr="라인, 도표, 그래프, 텍스트이(가) 표시된 사진&#10;&#10;자동 생성된 설명">
+            <a:extLst>
+              <a:ext uri="{FF2B5EF4-FFF2-40B4-BE49-F238E27FC236}">
+                <a16:creationId xmlns:a16="http://schemas.microsoft.com/office/drawing/2014/main" id="{DEA427F9-C073-3CE3-FD45-4894C7EE35AF}"/>
               </a:ext>
             </a:extLst>
           </p:cNvPr>
@@ -4355,44 +4465,8 @@
         </p:blipFill>
         <p:spPr>
           <a:xfrm>
-            <a:off x="-206478" y="2212206"/>
-            <a:ext cx="6600000" cy="3960000"/>
-          </a:xfrm>
-          <a:prstGeom prst="rect">
-            <a:avLst/>
-          </a:prstGeom>
-        </p:spPr>
-      </p:pic>
-      <p:pic>
-        <p:nvPicPr>
-          <p:cNvPr id="12" name="그림 11" descr="라인, 도표, 텍스트, 그래프이(가) 표시된 사진&#10;&#10;자동 생성된 설명">
-            <a:extLst>
-              <a:ext uri="{FF2B5EF4-FFF2-40B4-BE49-F238E27FC236}">
-                <a16:creationId xmlns:a16="http://schemas.microsoft.com/office/drawing/2014/main" id="{901D3C20-A7F2-7804-2929-F70963ADCBE6}"/>
-              </a:ext>
-            </a:extLst>
-          </p:cNvPr>
-          <p:cNvPicPr>
-            <a:picLocks noChangeAspect="1"/>
-          </p:cNvPicPr>
-          <p:nvPr/>
-        </p:nvPicPr>
-        <p:blipFill>
-          <a:blip r:embed="rId3">
-            <a:extLst>
-              <a:ext uri="{28A0092B-C50C-407E-A947-70E740481C1C}">
-                <a14:useLocalDpi xmlns:a14="http://schemas.microsoft.com/office/drawing/2010/main" val="0"/>
-              </a:ext>
-            </a:extLst>
-          </a:blip>
-          <a:stretch>
-            <a:fillRect/>
-          </a:stretch>
-        </p:blipFill>
-        <p:spPr>
-          <a:xfrm>
-            <a:off x="5798477" y="2212206"/>
-            <a:ext cx="6600000" cy="3960000"/>
+            <a:off x="1591191" y="1330181"/>
+            <a:ext cx="9000000" cy="5400000"/>
           </a:xfrm>
           <a:prstGeom prst="rect">
             <a:avLst/>
@@ -4429,6 +4503,330 @@
           <a:chExt cx="0" cy="0"/>
         </a:xfrm>
       </p:grpSpPr>
+      <p:sp>
+        <p:nvSpPr>
+          <p:cNvPr id="4" name="TextBox 3">
+            <a:extLst>
+              <a:ext uri="{FF2B5EF4-FFF2-40B4-BE49-F238E27FC236}">
+                <a16:creationId xmlns:a16="http://schemas.microsoft.com/office/drawing/2014/main" id="{3B092B35-58A6-8C07-03C0-9279B1D20F0D}"/>
+              </a:ext>
+            </a:extLst>
+          </p:cNvPr>
+          <p:cNvSpPr txBox="1"/>
+          <p:nvPr/>
+        </p:nvSpPr>
+        <p:spPr>
+          <a:xfrm>
+            <a:off x="1887059" y="127819"/>
+            <a:ext cx="8406660" cy="830997"/>
+          </a:xfrm>
+          <a:prstGeom prst="rect">
+            <a:avLst/>
+          </a:prstGeom>
+          <a:noFill/>
+        </p:spPr>
+        <p:txBody>
+          <a:bodyPr wrap="none" rtlCol="0">
+            <a:spAutoFit/>
+          </a:bodyPr>
+          <a:lstStyle/>
+          <a:p>
+            <a:r>
+              <a:rPr lang="en-US" altLang="ko-KR" sz="4800" b="1" dirty="0" err="1"/>
+              <a:t>dncase</a:t>
+            </a:r>
+            <a:r>
+              <a:rPr lang="ko-KR" altLang="en-US" sz="4800" b="1" dirty="0"/>
+              <a:t> </a:t>
+            </a:r>
+            <a:r>
+              <a:rPr lang="en-US" altLang="ko-KR" sz="4800" b="1" dirty="0"/>
+              <a:t>–</a:t>
+            </a:r>
+            <a:r>
+              <a:rPr lang="ko-KR" altLang="en-US" sz="4800" b="1" dirty="0"/>
+              <a:t> </a:t>
+            </a:r>
+            <a:r>
+              <a:rPr lang="en-US" altLang="ko-KR" sz="4800" b="1" dirty="0"/>
+              <a:t>different</a:t>
+            </a:r>
+            <a:r>
+              <a:rPr lang="ko-KR" altLang="en-US" sz="4800" b="1" dirty="0"/>
+              <a:t> </a:t>
+            </a:r>
+            <a:r>
+              <a:rPr lang="en-US" altLang="ko-KR" sz="4800" b="1" dirty="0"/>
+              <a:t>thickness</a:t>
+            </a:r>
+          </a:p>
+        </p:txBody>
+      </p:sp>
+      <p:pic>
+        <p:nvPicPr>
+          <p:cNvPr id="6" name="그림 5" descr="텍스트, 라인, 도표, 그래프이(가) 표시된 사진&#10;&#10;자동 생성된 설명">
+            <a:extLst>
+              <a:ext uri="{FF2B5EF4-FFF2-40B4-BE49-F238E27FC236}">
+                <a16:creationId xmlns:a16="http://schemas.microsoft.com/office/drawing/2014/main" id="{00F570A8-EDB2-7708-2761-10CEE381AAF8}"/>
+              </a:ext>
+            </a:extLst>
+          </p:cNvPr>
+          <p:cNvPicPr>
+            <a:picLocks noChangeAspect="1"/>
+          </p:cNvPicPr>
+          <p:nvPr/>
+        </p:nvPicPr>
+        <p:blipFill>
+          <a:blip r:embed="rId2">
+            <a:extLst>
+              <a:ext uri="{28A0092B-C50C-407E-A947-70E740481C1C}">
+                <a14:useLocalDpi xmlns:a14="http://schemas.microsoft.com/office/drawing/2010/main" val="0"/>
+              </a:ext>
+            </a:extLst>
+          </a:blip>
+          <a:stretch>
+            <a:fillRect/>
+          </a:stretch>
+        </p:blipFill>
+        <p:spPr>
+          <a:xfrm>
+            <a:off x="1590389" y="1330181"/>
+            <a:ext cx="9000000" cy="5400000"/>
+          </a:xfrm>
+          <a:prstGeom prst="rect">
+            <a:avLst/>
+          </a:prstGeom>
+        </p:spPr>
+      </p:pic>
+      <p:sp>
+        <p:nvSpPr>
+          <p:cNvPr id="7" name="직사각형 6">
+            <a:extLst>
+              <a:ext uri="{FF2B5EF4-FFF2-40B4-BE49-F238E27FC236}">
+                <a16:creationId xmlns:a16="http://schemas.microsoft.com/office/drawing/2014/main" id="{9D9234D5-BAAE-A6D5-6300-98EBF1A6F586}"/>
+              </a:ext>
+            </a:extLst>
+          </p:cNvPr>
+          <p:cNvSpPr/>
+          <p:nvPr/>
+        </p:nvSpPr>
+        <p:spPr>
+          <a:xfrm>
+            <a:off x="2703871" y="2035278"/>
+            <a:ext cx="4041058" cy="226142"/>
+          </a:xfrm>
+          <a:prstGeom prst="rect">
+            <a:avLst/>
+          </a:prstGeom>
+          <a:noFill/>
+          <a:ln w="38100">
+            <a:solidFill>
+              <a:srgbClr val="7030A0"/>
+            </a:solidFill>
+          </a:ln>
+        </p:spPr>
+        <p:style>
+          <a:lnRef idx="2">
+            <a:schemeClr val="accent1">
+              <a:shade val="15000"/>
+            </a:schemeClr>
+          </a:lnRef>
+          <a:fillRef idx="1">
+            <a:schemeClr val="accent1"/>
+          </a:fillRef>
+          <a:effectRef idx="0">
+            <a:schemeClr val="accent1"/>
+          </a:effectRef>
+          <a:fontRef idx="minor">
+            <a:schemeClr val="lt1"/>
+          </a:fontRef>
+        </p:style>
+        <p:txBody>
+          <a:bodyPr rtlCol="0" anchor="ctr"/>
+          <a:lstStyle/>
+          <a:p>
+            <a:pPr algn="ctr"/>
+            <a:endParaRPr lang="ko-KR" altLang="en-US"/>
+          </a:p>
+        </p:txBody>
+      </p:sp>
+    </p:spTree>
+    <p:extLst>
+      <p:ext uri="{BB962C8B-B14F-4D97-AF65-F5344CB8AC3E}">
+        <p14:creationId xmlns:p14="http://schemas.microsoft.com/office/powerpoint/2010/main" val="3281594670"/>
+      </p:ext>
+    </p:extLst>
+  </p:cSld>
+  <p:clrMapOvr>
+    <a:masterClrMapping/>
+  </p:clrMapOvr>
+</p:sld>
+</file>
+
+<file path=ppt/slides/slide12.xml><?xml version="1.0" encoding="utf-8"?>
+<p:sld xmlns:a="http://schemas.openxmlformats.org/drawingml/2006/main" xmlns:r="http://schemas.openxmlformats.org/officeDocument/2006/relationships" xmlns:p="http://schemas.openxmlformats.org/presentationml/2006/main">
+  <p:cSld>
+    <p:spTree>
+      <p:nvGrpSpPr>
+        <p:cNvPr id="1" name=""/>
+        <p:cNvGrpSpPr/>
+        <p:nvPr/>
+      </p:nvGrpSpPr>
+      <p:grpSpPr>
+        <a:xfrm>
+          <a:off x="0" y="0"/>
+          <a:ext cx="0" cy="0"/>
+          <a:chOff x="0" y="0"/>
+          <a:chExt cx="0" cy="0"/>
+        </a:xfrm>
+      </p:grpSpPr>
+      <p:sp>
+        <p:nvSpPr>
+          <p:cNvPr id="2" name="TextBox 1">
+            <a:extLst>
+              <a:ext uri="{FF2B5EF4-FFF2-40B4-BE49-F238E27FC236}">
+                <a16:creationId xmlns:a16="http://schemas.microsoft.com/office/drawing/2014/main" id="{79D497B1-52CA-BEE2-76AC-7833AF082841}"/>
+              </a:ext>
+            </a:extLst>
+          </p:cNvPr>
+          <p:cNvSpPr txBox="1"/>
+          <p:nvPr/>
+        </p:nvSpPr>
+        <p:spPr>
+          <a:xfrm>
+            <a:off x="1887059" y="127819"/>
+            <a:ext cx="8397042" cy="830997"/>
+          </a:xfrm>
+          <a:prstGeom prst="rect">
+            <a:avLst/>
+          </a:prstGeom>
+          <a:noFill/>
+        </p:spPr>
+        <p:txBody>
+          <a:bodyPr wrap="none" rtlCol="0">
+            <a:spAutoFit/>
+          </a:bodyPr>
+          <a:lstStyle/>
+          <a:p>
+            <a:r>
+              <a:rPr lang="en-US" altLang="ko-KR" sz="4800" b="1" dirty="0"/>
+              <a:t>uncase</a:t>
+            </a:r>
+            <a:r>
+              <a:rPr lang="ko-KR" altLang="en-US" sz="4800" b="1" dirty="0"/>
+              <a:t> </a:t>
+            </a:r>
+            <a:r>
+              <a:rPr lang="en-US" altLang="ko-KR" sz="4800" b="1" dirty="0"/>
+              <a:t>–</a:t>
+            </a:r>
+            <a:r>
+              <a:rPr lang="ko-KR" altLang="en-US" sz="4800" b="1" dirty="0"/>
+              <a:t> </a:t>
+            </a:r>
+            <a:r>
+              <a:rPr lang="en-US" altLang="ko-KR" sz="4800" b="1" dirty="0"/>
+              <a:t>different</a:t>
+            </a:r>
+            <a:r>
+              <a:rPr lang="ko-KR" altLang="en-US" sz="4800" b="1" dirty="0"/>
+              <a:t> </a:t>
+            </a:r>
+            <a:r>
+              <a:rPr lang="en-US" altLang="ko-KR" sz="4800" b="1" dirty="0"/>
+              <a:t>thickness</a:t>
+            </a:r>
+          </a:p>
+        </p:txBody>
+      </p:sp>
+      <p:pic>
+        <p:nvPicPr>
+          <p:cNvPr id="4" name="그림 3" descr="텍스트, 라인, 그래프, 도표이(가) 표시된 사진&#10;&#10;자동 생성된 설명">
+            <a:extLst>
+              <a:ext uri="{FF2B5EF4-FFF2-40B4-BE49-F238E27FC236}">
+                <a16:creationId xmlns:a16="http://schemas.microsoft.com/office/drawing/2014/main" id="{D81EA3B9-D301-F1F5-C464-A864C0C7D949}"/>
+              </a:ext>
+            </a:extLst>
+          </p:cNvPr>
+          <p:cNvPicPr>
+            <a:picLocks noChangeAspect="1"/>
+          </p:cNvPicPr>
+          <p:nvPr/>
+        </p:nvPicPr>
+        <p:blipFill>
+          <a:blip r:embed="rId2">
+            <a:extLst>
+              <a:ext uri="{28A0092B-C50C-407E-A947-70E740481C1C}">
+                <a14:useLocalDpi xmlns:a14="http://schemas.microsoft.com/office/drawing/2010/main" val="0"/>
+              </a:ext>
+            </a:extLst>
+          </a:blip>
+          <a:stretch>
+            <a:fillRect/>
+          </a:stretch>
+        </p:blipFill>
+        <p:spPr>
+          <a:xfrm>
+            <a:off x="1596000" y="1330181"/>
+            <a:ext cx="9000000" cy="5400000"/>
+          </a:xfrm>
+          <a:prstGeom prst="rect">
+            <a:avLst/>
+          </a:prstGeom>
+        </p:spPr>
+      </p:pic>
+      <p:sp>
+        <p:nvSpPr>
+          <p:cNvPr id="5" name="직사각형 4">
+            <a:extLst>
+              <a:ext uri="{FF2B5EF4-FFF2-40B4-BE49-F238E27FC236}">
+                <a16:creationId xmlns:a16="http://schemas.microsoft.com/office/drawing/2014/main" id="{B5F75FE4-35F7-4DF7-BAC8-6EC536A46805}"/>
+              </a:ext>
+            </a:extLst>
+          </p:cNvPr>
+          <p:cNvSpPr/>
+          <p:nvPr/>
+        </p:nvSpPr>
+        <p:spPr>
+          <a:xfrm>
+            <a:off x="2782528" y="2418905"/>
+            <a:ext cx="4041058" cy="599597"/>
+          </a:xfrm>
+          <a:prstGeom prst="rect">
+            <a:avLst/>
+          </a:prstGeom>
+          <a:noFill/>
+          <a:ln w="38100">
+            <a:solidFill>
+              <a:srgbClr val="7030A0"/>
+            </a:solidFill>
+          </a:ln>
+        </p:spPr>
+        <p:style>
+          <a:lnRef idx="2">
+            <a:schemeClr val="accent1">
+              <a:shade val="15000"/>
+            </a:schemeClr>
+          </a:lnRef>
+          <a:fillRef idx="1">
+            <a:schemeClr val="accent1"/>
+          </a:fillRef>
+          <a:effectRef idx="0">
+            <a:schemeClr val="accent1"/>
+          </a:effectRef>
+          <a:fontRef idx="minor">
+            <a:schemeClr val="lt1"/>
+          </a:fontRef>
+        </p:style>
+        <p:txBody>
+          <a:bodyPr rtlCol="0" anchor="ctr"/>
+          <a:lstStyle/>
+          <a:p>
+            <a:pPr algn="ctr"/>
+            <a:endParaRPr lang="ko-KR" altLang="en-US"/>
+          </a:p>
+        </p:txBody>
+      </p:sp>
     </p:spTree>
     <p:extLst>
       <p:ext uri="{BB962C8B-B14F-4D97-AF65-F5344CB8AC3E}">
@@ -6916,8 +7314,8 @@
         </p:blipFill>
         <p:spPr>
           <a:xfrm>
-            <a:off x="1523991" y="1243770"/>
-            <a:ext cx="9144018" cy="5486411"/>
+            <a:off x="1596000" y="1330181"/>
+            <a:ext cx="9000000" cy="5400000"/>
           </a:xfrm>
           <a:prstGeom prst="rect">
             <a:avLst/>

</xml_diff>

<commit_message>
0808update - exp diff diameter, 18, 30 / 0809 continuing 21,27,33
</commit_message>
<xml_diff>
--- a/lab_log0806.pptx
+++ b/lab_log0806.pptx
@@ -17,6 +17,10 @@
     <p:sldId id="265" r:id="rId11"/>
     <p:sldId id="267" r:id="rId12"/>
     <p:sldId id="266" r:id="rId13"/>
+    <p:sldId id="268" r:id="rId14"/>
+    <p:sldId id="269" r:id="rId15"/>
+    <p:sldId id="270" r:id="rId16"/>
+    <p:sldId id="271" r:id="rId17"/>
   </p:sldIdLst>
   <p:sldSz cx="12192000" cy="6858000"/>
   <p:notesSz cx="6858000" cy="9144000"/>
@@ -126,7 +130,7 @@
 <file path=ppt/revisionInfo.xml><?xml version="1.0" encoding="utf-8"?>
 <p1510:revInfo xmlns:a="http://schemas.openxmlformats.org/drawingml/2006/main" xmlns:r="http://schemas.openxmlformats.org/officeDocument/2006/relationships" xmlns:p1510="http://schemas.microsoft.com/office/powerpoint/2015/10/main">
   <p1510:revLst>
-    <p1510:client id="{A305CB3F-F413-43C7-9799-9F4D42D12FAC}" v="25" dt="2024-08-07T07:32:02.443"/>
+    <p1510:client id="{A305CB3F-F413-43C7-9799-9F4D42D12FAC}" v="36" dt="2024-08-08T08:59:33.340"/>
   </p1510:revLst>
 </p1510:revInfo>
 </file>
@@ -136,7 +140,7 @@
   <pc:docChgLst>
     <pc:chgData name="민서 오" userId="7d89e7b822021c56" providerId="LiveId" clId="{A305CB3F-F413-43C7-9799-9F4D42D12FAC}"/>
     <pc:docChg chg="undo custSel addSld modSld sldOrd">
-      <pc:chgData name="민서 오" userId="7d89e7b822021c56" providerId="LiveId" clId="{A305CB3F-F413-43C7-9799-9F4D42D12FAC}" dt="2024-08-07T07:32:18.296" v="253" actId="14100"/>
+      <pc:chgData name="민서 오" userId="7d89e7b822021c56" providerId="LiveId" clId="{A305CB3F-F413-43C7-9799-9F4D42D12FAC}" dt="2024-08-08T08:59:47.286" v="321" actId="1076"/>
       <pc:docMkLst>
         <pc:docMk/>
       </pc:docMkLst>
@@ -408,6 +412,138 @@
           </ac:picMkLst>
         </pc:picChg>
       </pc:sldChg>
+      <pc:sldChg chg="addSp delSp modSp new mod">
+        <pc:chgData name="민서 오" userId="7d89e7b822021c56" providerId="LiveId" clId="{A305CB3F-F413-43C7-9799-9F4D42D12FAC}" dt="2024-08-08T08:59:36.379" v="318" actId="1076"/>
+        <pc:sldMkLst>
+          <pc:docMk/>
+          <pc:sldMk cId="3285401794" sldId="268"/>
+        </pc:sldMkLst>
+        <pc:spChg chg="del">
+          <ac:chgData name="민서 오" userId="7d89e7b822021c56" providerId="LiveId" clId="{A305CB3F-F413-43C7-9799-9F4D42D12FAC}" dt="2024-08-08T08:58:21.484" v="256" actId="478"/>
+          <ac:spMkLst>
+            <pc:docMk/>
+            <pc:sldMk cId="3285401794" sldId="268"/>
+            <ac:spMk id="2" creationId="{6A783942-03BF-57F5-075A-BC54DBA185D0}"/>
+          </ac:spMkLst>
+        </pc:spChg>
+        <pc:spChg chg="del">
+          <ac:chgData name="민서 오" userId="7d89e7b822021c56" providerId="LiveId" clId="{A305CB3F-F413-43C7-9799-9F4D42D12FAC}" dt="2024-08-08T08:58:19.981" v="255" actId="478"/>
+          <ac:spMkLst>
+            <pc:docMk/>
+            <pc:sldMk cId="3285401794" sldId="268"/>
+            <ac:spMk id="3" creationId="{B4D77C01-60AE-7E52-1236-60F8E8D90738}"/>
+          </ac:spMkLst>
+        </pc:spChg>
+        <pc:spChg chg="add mod">
+          <ac:chgData name="민서 오" userId="7d89e7b822021c56" providerId="LiveId" clId="{A305CB3F-F413-43C7-9799-9F4D42D12FAC}" dt="2024-08-08T08:58:43.645" v="295" actId="20577"/>
+          <ac:spMkLst>
+            <pc:docMk/>
+            <pc:sldMk cId="3285401794" sldId="268"/>
+            <ac:spMk id="4" creationId="{54CE3854-7E54-1AF6-0859-C4827976A894}"/>
+          </ac:spMkLst>
+        </pc:spChg>
+        <pc:picChg chg="add mod">
+          <ac:chgData name="민서 오" userId="7d89e7b822021c56" providerId="LiveId" clId="{A305CB3F-F413-43C7-9799-9F4D42D12FAC}" dt="2024-08-08T08:59:36.379" v="318" actId="1076"/>
+          <ac:picMkLst>
+            <pc:docMk/>
+            <pc:sldMk cId="3285401794" sldId="268"/>
+            <ac:picMk id="6" creationId="{FD819842-48CB-2EE2-AB8B-A3DBE097DB55}"/>
+          </ac:picMkLst>
+        </pc:picChg>
+      </pc:sldChg>
+      <pc:sldChg chg="addSp modSp add mod">
+        <pc:chgData name="민서 오" userId="7d89e7b822021c56" providerId="LiveId" clId="{A305CB3F-F413-43C7-9799-9F4D42D12FAC}" dt="2024-08-08T08:59:38.168" v="319" actId="1076"/>
+        <pc:sldMkLst>
+          <pc:docMk/>
+          <pc:sldMk cId="2506622858" sldId="269"/>
+        </pc:sldMkLst>
+        <pc:spChg chg="mod">
+          <ac:chgData name="민서 오" userId="7d89e7b822021c56" providerId="LiveId" clId="{A305CB3F-F413-43C7-9799-9F4D42D12FAC}" dt="2024-08-08T08:58:50.669" v="296"/>
+          <ac:spMkLst>
+            <pc:docMk/>
+            <pc:sldMk cId="2506622858" sldId="269"/>
+            <ac:spMk id="4" creationId="{54CE3854-7E54-1AF6-0859-C4827976A894}"/>
+          </ac:spMkLst>
+        </pc:spChg>
+        <pc:picChg chg="add mod">
+          <ac:chgData name="민서 오" userId="7d89e7b822021c56" providerId="LiveId" clId="{A305CB3F-F413-43C7-9799-9F4D42D12FAC}" dt="2024-08-08T08:59:38.168" v="319" actId="1076"/>
+          <ac:picMkLst>
+            <pc:docMk/>
+            <pc:sldMk cId="2506622858" sldId="269"/>
+            <ac:picMk id="10" creationId="{D0225500-72C1-4F42-238A-3F1FC84C989F}"/>
+          </ac:picMkLst>
+        </pc:picChg>
+      </pc:sldChg>
+      <pc:sldChg chg="addSp modSp add mod">
+        <pc:chgData name="민서 오" userId="7d89e7b822021c56" providerId="LiveId" clId="{A305CB3F-F413-43C7-9799-9F4D42D12FAC}" dt="2024-08-08T08:59:40.907" v="320" actId="1076"/>
+        <pc:sldMkLst>
+          <pc:docMk/>
+          <pc:sldMk cId="2506723362" sldId="270"/>
+        </pc:sldMkLst>
+        <pc:spChg chg="mod">
+          <ac:chgData name="민서 오" userId="7d89e7b822021c56" providerId="LiveId" clId="{A305CB3F-F413-43C7-9799-9F4D42D12FAC}" dt="2024-08-08T08:58:52.862" v="297"/>
+          <ac:spMkLst>
+            <pc:docMk/>
+            <pc:sldMk cId="2506723362" sldId="270"/>
+            <ac:spMk id="4" creationId="{54CE3854-7E54-1AF6-0859-C4827976A894}"/>
+          </ac:spMkLst>
+        </pc:spChg>
+        <pc:picChg chg="add mod">
+          <ac:chgData name="민서 오" userId="7d89e7b822021c56" providerId="LiveId" clId="{A305CB3F-F413-43C7-9799-9F4D42D12FAC}" dt="2024-08-08T08:59:40.907" v="320" actId="1076"/>
+          <ac:picMkLst>
+            <pc:docMk/>
+            <pc:sldMk cId="2506723362" sldId="270"/>
+            <ac:picMk id="3" creationId="{93288F6E-C742-4B3C-A078-14FF104C8F84}"/>
+          </ac:picMkLst>
+        </pc:picChg>
+      </pc:sldChg>
+      <pc:sldChg chg="addSp delSp modSp add mod">
+        <pc:chgData name="민서 오" userId="7d89e7b822021c56" providerId="LiveId" clId="{A305CB3F-F413-43C7-9799-9F4D42D12FAC}" dt="2024-08-08T08:59:47.286" v="321" actId="1076"/>
+        <pc:sldMkLst>
+          <pc:docMk/>
+          <pc:sldMk cId="2656696961" sldId="271"/>
+        </pc:sldMkLst>
+        <pc:spChg chg="mod">
+          <ac:chgData name="민서 오" userId="7d89e7b822021c56" providerId="LiveId" clId="{A305CB3F-F413-43C7-9799-9F4D42D12FAC}" dt="2024-08-08T08:58:55.303" v="298"/>
+          <ac:spMkLst>
+            <pc:docMk/>
+            <pc:sldMk cId="2656696961" sldId="271"/>
+            <ac:spMk id="4" creationId="{54CE3854-7E54-1AF6-0859-C4827976A894}"/>
+          </ac:spMkLst>
+        </pc:spChg>
+        <pc:picChg chg="add del mod">
+          <ac:chgData name="민서 오" userId="7d89e7b822021c56" providerId="LiveId" clId="{A305CB3F-F413-43C7-9799-9F4D42D12FAC}" dt="2024-08-08T08:59:32.434" v="316" actId="21"/>
+          <ac:picMkLst>
+            <pc:docMk/>
+            <pc:sldMk cId="2656696961" sldId="271"/>
+            <ac:picMk id="3" creationId="{93288F6E-C742-4B3C-A078-14FF104C8F84}"/>
+          </ac:picMkLst>
+        </pc:picChg>
+        <pc:picChg chg="add del mod">
+          <ac:chgData name="민서 오" userId="7d89e7b822021c56" providerId="LiveId" clId="{A305CB3F-F413-43C7-9799-9F4D42D12FAC}" dt="2024-08-08T08:59:27.565" v="314" actId="21"/>
+          <ac:picMkLst>
+            <pc:docMk/>
+            <pc:sldMk cId="2656696961" sldId="271"/>
+            <ac:picMk id="6" creationId="{FD819842-48CB-2EE2-AB8B-A3DBE097DB55}"/>
+          </ac:picMkLst>
+        </pc:picChg>
+        <pc:picChg chg="add mod">
+          <ac:chgData name="민서 오" userId="7d89e7b822021c56" providerId="LiveId" clId="{A305CB3F-F413-43C7-9799-9F4D42D12FAC}" dt="2024-08-08T08:59:47.286" v="321" actId="1076"/>
+          <ac:picMkLst>
+            <pc:docMk/>
+            <pc:sldMk cId="2656696961" sldId="271"/>
+            <ac:picMk id="8" creationId="{8236B02E-CDE5-225E-DFBC-B4457051CCA8}"/>
+          </ac:picMkLst>
+        </pc:picChg>
+        <pc:picChg chg="add del mod">
+          <ac:chgData name="민서 오" userId="7d89e7b822021c56" providerId="LiveId" clId="{A305CB3F-F413-43C7-9799-9F4D42D12FAC}" dt="2024-08-08T08:59:22.212" v="311" actId="21"/>
+          <ac:picMkLst>
+            <pc:docMk/>
+            <pc:sldMk cId="2656696961" sldId="271"/>
+            <ac:picMk id="10" creationId="{D0225500-72C1-4F42-238A-3F1FC84C989F}"/>
+          </ac:picMkLst>
+        </pc:picChg>
+      </pc:sldChg>
     </pc:docChg>
   </pc:docChgLst>
 </pc:chgInfo>
@@ -560,7 +696,7 @@
           <a:p>
             <a:fld id="{843012E4-EA86-4BA1-A56C-00CD16D7F17B}" type="datetimeFigureOut">
               <a:rPr lang="ko-KR" altLang="en-US" smtClean="0"/>
-              <a:t>2024-08-07</a:t>
+              <a:t>2024-08-08</a:t>
             </a:fld>
             <a:endParaRPr lang="ko-KR" altLang="en-US"/>
           </a:p>
@@ -758,7 +894,7 @@
           <a:p>
             <a:fld id="{843012E4-EA86-4BA1-A56C-00CD16D7F17B}" type="datetimeFigureOut">
               <a:rPr lang="ko-KR" altLang="en-US" smtClean="0"/>
-              <a:t>2024-08-07</a:t>
+              <a:t>2024-08-08</a:t>
             </a:fld>
             <a:endParaRPr lang="ko-KR" altLang="en-US"/>
           </a:p>
@@ -966,7 +1102,7 @@
           <a:p>
             <a:fld id="{843012E4-EA86-4BA1-A56C-00CD16D7F17B}" type="datetimeFigureOut">
               <a:rPr lang="ko-KR" altLang="en-US" smtClean="0"/>
-              <a:t>2024-08-07</a:t>
+              <a:t>2024-08-08</a:t>
             </a:fld>
             <a:endParaRPr lang="ko-KR" altLang="en-US"/>
           </a:p>
@@ -1164,7 +1300,7 @@
           <a:p>
             <a:fld id="{843012E4-EA86-4BA1-A56C-00CD16D7F17B}" type="datetimeFigureOut">
               <a:rPr lang="ko-KR" altLang="en-US" smtClean="0"/>
-              <a:t>2024-08-07</a:t>
+              <a:t>2024-08-08</a:t>
             </a:fld>
             <a:endParaRPr lang="ko-KR" altLang="en-US"/>
           </a:p>
@@ -1439,7 +1575,7 @@
           <a:p>
             <a:fld id="{843012E4-EA86-4BA1-A56C-00CD16D7F17B}" type="datetimeFigureOut">
               <a:rPr lang="ko-KR" altLang="en-US" smtClean="0"/>
-              <a:t>2024-08-07</a:t>
+              <a:t>2024-08-08</a:t>
             </a:fld>
             <a:endParaRPr lang="ko-KR" altLang="en-US"/>
           </a:p>
@@ -1704,7 +1840,7 @@
           <a:p>
             <a:fld id="{843012E4-EA86-4BA1-A56C-00CD16D7F17B}" type="datetimeFigureOut">
               <a:rPr lang="ko-KR" altLang="en-US" smtClean="0"/>
-              <a:t>2024-08-07</a:t>
+              <a:t>2024-08-08</a:t>
             </a:fld>
             <a:endParaRPr lang="ko-KR" altLang="en-US"/>
           </a:p>
@@ -2116,7 +2252,7 @@
           <a:p>
             <a:fld id="{843012E4-EA86-4BA1-A56C-00CD16D7F17B}" type="datetimeFigureOut">
               <a:rPr lang="ko-KR" altLang="en-US" smtClean="0"/>
-              <a:t>2024-08-07</a:t>
+              <a:t>2024-08-08</a:t>
             </a:fld>
             <a:endParaRPr lang="ko-KR" altLang="en-US"/>
           </a:p>
@@ -2257,7 +2393,7 @@
           <a:p>
             <a:fld id="{843012E4-EA86-4BA1-A56C-00CD16D7F17B}" type="datetimeFigureOut">
               <a:rPr lang="ko-KR" altLang="en-US" smtClean="0"/>
-              <a:t>2024-08-07</a:t>
+              <a:t>2024-08-08</a:t>
             </a:fld>
             <a:endParaRPr lang="ko-KR" altLang="en-US"/>
           </a:p>
@@ -2370,7 +2506,7 @@
           <a:p>
             <a:fld id="{843012E4-EA86-4BA1-A56C-00CD16D7F17B}" type="datetimeFigureOut">
               <a:rPr lang="ko-KR" altLang="en-US" smtClean="0"/>
-              <a:t>2024-08-07</a:t>
+              <a:t>2024-08-08</a:t>
             </a:fld>
             <a:endParaRPr lang="ko-KR" altLang="en-US"/>
           </a:p>
@@ -2681,7 +2817,7 @@
           <a:p>
             <a:fld id="{843012E4-EA86-4BA1-A56C-00CD16D7F17B}" type="datetimeFigureOut">
               <a:rPr lang="ko-KR" altLang="en-US" smtClean="0"/>
-              <a:t>2024-08-07</a:t>
+              <a:t>2024-08-08</a:t>
             </a:fld>
             <a:endParaRPr lang="ko-KR" altLang="en-US"/>
           </a:p>
@@ -2969,7 +3105,7 @@
           <a:p>
             <a:fld id="{843012E4-EA86-4BA1-A56C-00CD16D7F17B}" type="datetimeFigureOut">
               <a:rPr lang="ko-KR" altLang="en-US" smtClean="0"/>
-              <a:t>2024-08-07</a:t>
+              <a:t>2024-08-08</a:t>
             </a:fld>
             <a:endParaRPr lang="ko-KR" altLang="en-US"/>
           </a:p>
@@ -3210,7 +3346,7 @@
           <a:p>
             <a:fld id="{843012E4-EA86-4BA1-A56C-00CD16D7F17B}" type="datetimeFigureOut">
               <a:rPr lang="ko-KR" altLang="en-US" smtClean="0"/>
-              <a:t>2024-08-07</a:t>
+              <a:t>2024-08-08</a:t>
             </a:fld>
             <a:endParaRPr lang="ko-KR" altLang="en-US"/>
           </a:p>
@@ -4840,6 +4976,506 @@
 </p:sld>
 </file>
 
+<file path=ppt/slides/slide13.xml><?xml version="1.0" encoding="utf-8"?>
+<p:sld xmlns:a="http://schemas.openxmlformats.org/drawingml/2006/main" xmlns:r="http://schemas.openxmlformats.org/officeDocument/2006/relationships" xmlns:p="http://schemas.openxmlformats.org/presentationml/2006/main">
+  <p:cSld>
+    <p:spTree>
+      <p:nvGrpSpPr>
+        <p:cNvPr id="1" name=""/>
+        <p:cNvGrpSpPr/>
+        <p:nvPr/>
+      </p:nvGrpSpPr>
+      <p:grpSpPr>
+        <a:xfrm>
+          <a:off x="0" y="0"/>
+          <a:ext cx="0" cy="0"/>
+          <a:chOff x="0" y="0"/>
+          <a:chExt cx="0" cy="0"/>
+        </a:xfrm>
+      </p:grpSpPr>
+      <p:sp>
+        <p:nvSpPr>
+          <p:cNvPr id="4" name="TextBox 3">
+            <a:extLst>
+              <a:ext uri="{FF2B5EF4-FFF2-40B4-BE49-F238E27FC236}">
+                <a16:creationId xmlns:a16="http://schemas.microsoft.com/office/drawing/2014/main" id="{54CE3854-7E54-1AF6-0859-C4827976A894}"/>
+              </a:ext>
+            </a:extLst>
+          </p:cNvPr>
+          <p:cNvSpPr txBox="1"/>
+          <p:nvPr/>
+        </p:nvSpPr>
+        <p:spPr>
+          <a:xfrm>
+            <a:off x="1887059" y="127819"/>
+            <a:ext cx="8327023" cy="830997"/>
+          </a:xfrm>
+          <a:prstGeom prst="rect">
+            <a:avLst/>
+          </a:prstGeom>
+          <a:noFill/>
+        </p:spPr>
+        <p:txBody>
+          <a:bodyPr wrap="none" rtlCol="0">
+            <a:spAutoFit/>
+          </a:bodyPr>
+          <a:lstStyle/>
+          <a:p>
+            <a:r>
+              <a:rPr lang="en-US" altLang="ko-KR" sz="4800" b="1" dirty="0" err="1"/>
+              <a:t>dpcase</a:t>
+            </a:r>
+            <a:r>
+              <a:rPr lang="ko-KR" altLang="en-US" sz="4800" b="1" dirty="0"/>
+              <a:t> </a:t>
+            </a:r>
+            <a:r>
+              <a:rPr lang="en-US" altLang="ko-KR" sz="4800" b="1" dirty="0"/>
+              <a:t>–</a:t>
+            </a:r>
+            <a:r>
+              <a:rPr lang="ko-KR" altLang="en-US" sz="4800" b="1" dirty="0"/>
+              <a:t> </a:t>
+            </a:r>
+            <a:r>
+              <a:rPr lang="en-US" altLang="ko-KR" sz="4800" b="1" dirty="0"/>
+              <a:t>different</a:t>
+            </a:r>
+            <a:r>
+              <a:rPr lang="ko-KR" altLang="en-US" sz="4800" b="1" dirty="0"/>
+              <a:t> </a:t>
+            </a:r>
+            <a:r>
+              <a:rPr lang="en-US" altLang="ko-KR" sz="4800" b="1" dirty="0"/>
+              <a:t>diameter</a:t>
+            </a:r>
+          </a:p>
+        </p:txBody>
+      </p:sp>
+      <p:pic>
+        <p:nvPicPr>
+          <p:cNvPr id="6" name="그림 5" descr="텍스트, 라인, 도표, 그래프이(가) 표시된 사진&#10;&#10;자동 생성된 설명">
+            <a:extLst>
+              <a:ext uri="{FF2B5EF4-FFF2-40B4-BE49-F238E27FC236}">
+                <a16:creationId xmlns:a16="http://schemas.microsoft.com/office/drawing/2014/main" id="{FD819842-48CB-2EE2-AB8B-A3DBE097DB55}"/>
+              </a:ext>
+            </a:extLst>
+          </p:cNvPr>
+          <p:cNvPicPr>
+            <a:picLocks noChangeAspect="1"/>
+          </p:cNvPicPr>
+          <p:nvPr/>
+        </p:nvPicPr>
+        <p:blipFill>
+          <a:blip r:embed="rId2">
+            <a:extLst>
+              <a:ext uri="{28A0092B-C50C-407E-A947-70E740481C1C}">
+                <a14:useLocalDpi xmlns:a14="http://schemas.microsoft.com/office/drawing/2010/main" val="0"/>
+              </a:ext>
+            </a:extLst>
+          </a:blip>
+          <a:stretch>
+            <a:fillRect/>
+          </a:stretch>
+        </p:blipFill>
+        <p:spPr>
+          <a:xfrm>
+            <a:off x="1523991" y="1243770"/>
+            <a:ext cx="9144018" cy="5486411"/>
+          </a:xfrm>
+          <a:prstGeom prst="rect">
+            <a:avLst/>
+          </a:prstGeom>
+        </p:spPr>
+      </p:pic>
+    </p:spTree>
+    <p:extLst>
+      <p:ext uri="{BB962C8B-B14F-4D97-AF65-F5344CB8AC3E}">
+        <p14:creationId xmlns:p14="http://schemas.microsoft.com/office/powerpoint/2010/main" val="3285401794"/>
+      </p:ext>
+    </p:extLst>
+  </p:cSld>
+  <p:clrMapOvr>
+    <a:masterClrMapping/>
+  </p:clrMapOvr>
+</p:sld>
+</file>
+
+<file path=ppt/slides/slide14.xml><?xml version="1.0" encoding="utf-8"?>
+<p:sld xmlns:a="http://schemas.openxmlformats.org/drawingml/2006/main" xmlns:r="http://schemas.openxmlformats.org/officeDocument/2006/relationships" xmlns:p="http://schemas.openxmlformats.org/presentationml/2006/main">
+  <p:cSld>
+    <p:spTree>
+      <p:nvGrpSpPr>
+        <p:cNvPr id="1" name=""/>
+        <p:cNvGrpSpPr/>
+        <p:nvPr/>
+      </p:nvGrpSpPr>
+      <p:grpSpPr>
+        <a:xfrm>
+          <a:off x="0" y="0"/>
+          <a:ext cx="0" cy="0"/>
+          <a:chOff x="0" y="0"/>
+          <a:chExt cx="0" cy="0"/>
+        </a:xfrm>
+      </p:grpSpPr>
+      <p:sp>
+        <p:nvSpPr>
+          <p:cNvPr id="4" name="TextBox 3">
+            <a:extLst>
+              <a:ext uri="{FF2B5EF4-FFF2-40B4-BE49-F238E27FC236}">
+                <a16:creationId xmlns:a16="http://schemas.microsoft.com/office/drawing/2014/main" id="{54CE3854-7E54-1AF6-0859-C4827976A894}"/>
+              </a:ext>
+            </a:extLst>
+          </p:cNvPr>
+          <p:cNvSpPr txBox="1"/>
+          <p:nvPr/>
+        </p:nvSpPr>
+        <p:spPr>
+          <a:xfrm>
+            <a:off x="1887059" y="127819"/>
+            <a:ext cx="8408264" cy="830997"/>
+          </a:xfrm>
+          <a:prstGeom prst="rect">
+            <a:avLst/>
+          </a:prstGeom>
+          <a:noFill/>
+        </p:spPr>
+        <p:txBody>
+          <a:bodyPr wrap="none" rtlCol="0">
+            <a:spAutoFit/>
+          </a:bodyPr>
+          <a:lstStyle/>
+          <a:p>
+            <a:r>
+              <a:rPr lang="en-US" altLang="ko-KR" sz="4800" b="1" dirty="0" err="1"/>
+              <a:t>upcase</a:t>
+            </a:r>
+            <a:r>
+              <a:rPr lang="ko-KR" altLang="en-US" sz="4800" b="1" dirty="0"/>
+              <a:t> </a:t>
+            </a:r>
+            <a:r>
+              <a:rPr lang="en-US" altLang="ko-KR" sz="4800" b="1" dirty="0"/>
+              <a:t>–</a:t>
+            </a:r>
+            <a:r>
+              <a:rPr lang="ko-KR" altLang="en-US" sz="4800" b="1" dirty="0"/>
+              <a:t> </a:t>
+            </a:r>
+            <a:r>
+              <a:rPr lang="en-US" altLang="ko-KR" sz="4800" b="1" dirty="0"/>
+              <a:t>different</a:t>
+            </a:r>
+            <a:r>
+              <a:rPr lang="ko-KR" altLang="en-US" sz="4800" b="1" dirty="0"/>
+              <a:t> </a:t>
+            </a:r>
+            <a:r>
+              <a:rPr lang="en-US" altLang="ko-KR" sz="4800" b="1" dirty="0"/>
+              <a:t>diameter</a:t>
+            </a:r>
+          </a:p>
+        </p:txBody>
+      </p:sp>
+      <p:pic>
+        <p:nvPicPr>
+          <p:cNvPr id="10" name="그림 9" descr="라인, 텍스트, 도표, 그래프이(가) 표시된 사진&#10;&#10;자동 생성된 설명">
+            <a:extLst>
+              <a:ext uri="{FF2B5EF4-FFF2-40B4-BE49-F238E27FC236}">
+                <a16:creationId xmlns:a16="http://schemas.microsoft.com/office/drawing/2014/main" id="{D0225500-72C1-4F42-238A-3F1FC84C989F}"/>
+              </a:ext>
+            </a:extLst>
+          </p:cNvPr>
+          <p:cNvPicPr>
+            <a:picLocks noChangeAspect="1"/>
+          </p:cNvPicPr>
+          <p:nvPr/>
+        </p:nvPicPr>
+        <p:blipFill>
+          <a:blip r:embed="rId2">
+            <a:extLst>
+              <a:ext uri="{28A0092B-C50C-407E-A947-70E740481C1C}">
+                <a14:useLocalDpi xmlns:a14="http://schemas.microsoft.com/office/drawing/2010/main" val="0"/>
+              </a:ext>
+            </a:extLst>
+          </a:blip>
+          <a:stretch>
+            <a:fillRect/>
+          </a:stretch>
+        </p:blipFill>
+        <p:spPr>
+          <a:xfrm>
+            <a:off x="1519182" y="1243770"/>
+            <a:ext cx="9144018" cy="5486411"/>
+          </a:xfrm>
+          <a:prstGeom prst="rect">
+            <a:avLst/>
+          </a:prstGeom>
+        </p:spPr>
+      </p:pic>
+    </p:spTree>
+    <p:extLst>
+      <p:ext uri="{BB962C8B-B14F-4D97-AF65-F5344CB8AC3E}">
+        <p14:creationId xmlns:p14="http://schemas.microsoft.com/office/powerpoint/2010/main" val="2506622858"/>
+      </p:ext>
+    </p:extLst>
+  </p:cSld>
+  <p:clrMapOvr>
+    <a:masterClrMapping/>
+  </p:clrMapOvr>
+</p:sld>
+</file>
+
+<file path=ppt/slides/slide15.xml><?xml version="1.0" encoding="utf-8"?>
+<p:sld xmlns:a="http://schemas.openxmlformats.org/drawingml/2006/main" xmlns:r="http://schemas.openxmlformats.org/officeDocument/2006/relationships" xmlns:p="http://schemas.openxmlformats.org/presentationml/2006/main">
+  <p:cSld>
+    <p:spTree>
+      <p:nvGrpSpPr>
+        <p:cNvPr id="1" name=""/>
+        <p:cNvGrpSpPr/>
+        <p:nvPr/>
+      </p:nvGrpSpPr>
+      <p:grpSpPr>
+        <a:xfrm>
+          <a:off x="0" y="0"/>
+          <a:ext cx="0" cy="0"/>
+          <a:chOff x="0" y="0"/>
+          <a:chExt cx="0" cy="0"/>
+        </a:xfrm>
+      </p:grpSpPr>
+      <p:sp>
+        <p:nvSpPr>
+          <p:cNvPr id="4" name="TextBox 3">
+            <a:extLst>
+              <a:ext uri="{FF2B5EF4-FFF2-40B4-BE49-F238E27FC236}">
+                <a16:creationId xmlns:a16="http://schemas.microsoft.com/office/drawing/2014/main" id="{54CE3854-7E54-1AF6-0859-C4827976A894}"/>
+              </a:ext>
+            </a:extLst>
+          </p:cNvPr>
+          <p:cNvSpPr txBox="1"/>
+          <p:nvPr/>
+        </p:nvSpPr>
+        <p:spPr>
+          <a:xfrm>
+            <a:off x="1887059" y="127819"/>
+            <a:ext cx="8406660" cy="830997"/>
+          </a:xfrm>
+          <a:prstGeom prst="rect">
+            <a:avLst/>
+          </a:prstGeom>
+          <a:noFill/>
+        </p:spPr>
+        <p:txBody>
+          <a:bodyPr wrap="none" rtlCol="0">
+            <a:spAutoFit/>
+          </a:bodyPr>
+          <a:lstStyle/>
+          <a:p>
+            <a:r>
+              <a:rPr lang="en-US" altLang="ko-KR" sz="4800" b="1" dirty="0" err="1"/>
+              <a:t>dncase</a:t>
+            </a:r>
+            <a:r>
+              <a:rPr lang="ko-KR" altLang="en-US" sz="4800" b="1" dirty="0"/>
+              <a:t> </a:t>
+            </a:r>
+            <a:r>
+              <a:rPr lang="en-US" altLang="ko-KR" sz="4800" b="1" dirty="0"/>
+              <a:t>–</a:t>
+            </a:r>
+            <a:r>
+              <a:rPr lang="ko-KR" altLang="en-US" sz="4800" b="1" dirty="0"/>
+              <a:t> </a:t>
+            </a:r>
+            <a:r>
+              <a:rPr lang="en-US" altLang="ko-KR" sz="4800" b="1" dirty="0"/>
+              <a:t>different</a:t>
+            </a:r>
+            <a:r>
+              <a:rPr lang="ko-KR" altLang="en-US" sz="4800" b="1" dirty="0"/>
+              <a:t> </a:t>
+            </a:r>
+            <a:r>
+              <a:rPr lang="en-US" altLang="ko-KR" sz="4800" b="1" dirty="0"/>
+              <a:t>diameter</a:t>
+            </a:r>
+          </a:p>
+        </p:txBody>
+      </p:sp>
+      <p:pic>
+        <p:nvPicPr>
+          <p:cNvPr id="3" name="그림 2" descr="텍스트, 라인, 도표, 그래프이(가) 표시된 사진&#10;&#10;자동 생성된 설명">
+            <a:extLst>
+              <a:ext uri="{FF2B5EF4-FFF2-40B4-BE49-F238E27FC236}">
+                <a16:creationId xmlns:a16="http://schemas.microsoft.com/office/drawing/2014/main" id="{93288F6E-C742-4B3C-A078-14FF104C8F84}"/>
+              </a:ext>
+            </a:extLst>
+          </p:cNvPr>
+          <p:cNvPicPr>
+            <a:picLocks noChangeAspect="1"/>
+          </p:cNvPicPr>
+          <p:nvPr/>
+        </p:nvPicPr>
+        <p:blipFill>
+          <a:blip r:embed="rId2">
+            <a:extLst>
+              <a:ext uri="{28A0092B-C50C-407E-A947-70E740481C1C}">
+                <a14:useLocalDpi xmlns:a14="http://schemas.microsoft.com/office/drawing/2010/main" val="0"/>
+              </a:ext>
+            </a:extLst>
+          </a:blip>
+          <a:stretch>
+            <a:fillRect/>
+          </a:stretch>
+        </p:blipFill>
+        <p:spPr>
+          <a:xfrm>
+            <a:off x="1518380" y="1243770"/>
+            <a:ext cx="9144018" cy="5486411"/>
+          </a:xfrm>
+          <a:prstGeom prst="rect">
+            <a:avLst/>
+          </a:prstGeom>
+        </p:spPr>
+      </p:pic>
+    </p:spTree>
+    <p:extLst>
+      <p:ext uri="{BB962C8B-B14F-4D97-AF65-F5344CB8AC3E}">
+        <p14:creationId xmlns:p14="http://schemas.microsoft.com/office/powerpoint/2010/main" val="2506723362"/>
+      </p:ext>
+    </p:extLst>
+  </p:cSld>
+  <p:clrMapOvr>
+    <a:masterClrMapping/>
+  </p:clrMapOvr>
+</p:sld>
+</file>
+
+<file path=ppt/slides/slide16.xml><?xml version="1.0" encoding="utf-8"?>
+<p:sld xmlns:a="http://schemas.openxmlformats.org/drawingml/2006/main" xmlns:r="http://schemas.openxmlformats.org/officeDocument/2006/relationships" xmlns:p="http://schemas.openxmlformats.org/presentationml/2006/main">
+  <p:cSld>
+    <p:spTree>
+      <p:nvGrpSpPr>
+        <p:cNvPr id="1" name=""/>
+        <p:cNvGrpSpPr/>
+        <p:nvPr/>
+      </p:nvGrpSpPr>
+      <p:grpSpPr>
+        <a:xfrm>
+          <a:off x="0" y="0"/>
+          <a:ext cx="0" cy="0"/>
+          <a:chOff x="0" y="0"/>
+          <a:chExt cx="0" cy="0"/>
+        </a:xfrm>
+      </p:grpSpPr>
+      <p:sp>
+        <p:nvSpPr>
+          <p:cNvPr id="4" name="TextBox 3">
+            <a:extLst>
+              <a:ext uri="{FF2B5EF4-FFF2-40B4-BE49-F238E27FC236}">
+                <a16:creationId xmlns:a16="http://schemas.microsoft.com/office/drawing/2014/main" id="{54CE3854-7E54-1AF6-0859-C4827976A894}"/>
+              </a:ext>
+            </a:extLst>
+          </p:cNvPr>
+          <p:cNvSpPr txBox="1"/>
+          <p:nvPr/>
+        </p:nvSpPr>
+        <p:spPr>
+          <a:xfrm>
+            <a:off x="1887059" y="127819"/>
+            <a:ext cx="8397042" cy="830997"/>
+          </a:xfrm>
+          <a:prstGeom prst="rect">
+            <a:avLst/>
+          </a:prstGeom>
+          <a:noFill/>
+        </p:spPr>
+        <p:txBody>
+          <a:bodyPr wrap="none" rtlCol="0">
+            <a:spAutoFit/>
+          </a:bodyPr>
+          <a:lstStyle/>
+          <a:p>
+            <a:r>
+              <a:rPr lang="en-US" altLang="ko-KR" sz="4800" b="1" dirty="0"/>
+              <a:t>uncase</a:t>
+            </a:r>
+            <a:r>
+              <a:rPr lang="ko-KR" altLang="en-US" sz="4800" b="1" dirty="0"/>
+              <a:t> </a:t>
+            </a:r>
+            <a:r>
+              <a:rPr lang="en-US" altLang="ko-KR" sz="4800" b="1" dirty="0"/>
+              <a:t>–</a:t>
+            </a:r>
+            <a:r>
+              <a:rPr lang="ko-KR" altLang="en-US" sz="4800" b="1" dirty="0"/>
+              <a:t> </a:t>
+            </a:r>
+            <a:r>
+              <a:rPr lang="en-US" altLang="ko-KR" sz="4800" b="1" dirty="0"/>
+              <a:t>different</a:t>
+            </a:r>
+            <a:r>
+              <a:rPr lang="ko-KR" altLang="en-US" sz="4800" b="1" dirty="0"/>
+              <a:t> </a:t>
+            </a:r>
+            <a:r>
+              <a:rPr lang="en-US" altLang="ko-KR" sz="4800" b="1" dirty="0"/>
+              <a:t>diameter</a:t>
+            </a:r>
+          </a:p>
+        </p:txBody>
+      </p:sp>
+      <p:pic>
+        <p:nvPicPr>
+          <p:cNvPr id="8" name="그림 7" descr="텍스트, 라인, 도표, 그래프이(가) 표시된 사진&#10;&#10;자동 생성된 설명">
+            <a:extLst>
+              <a:ext uri="{FF2B5EF4-FFF2-40B4-BE49-F238E27FC236}">
+                <a16:creationId xmlns:a16="http://schemas.microsoft.com/office/drawing/2014/main" id="{8236B02E-CDE5-225E-DFBC-B4457051CCA8}"/>
+              </a:ext>
+            </a:extLst>
+          </p:cNvPr>
+          <p:cNvPicPr>
+            <a:picLocks noChangeAspect="1"/>
+          </p:cNvPicPr>
+          <p:nvPr/>
+        </p:nvPicPr>
+        <p:blipFill>
+          <a:blip r:embed="rId2">
+            <a:extLst>
+              <a:ext uri="{28A0092B-C50C-407E-A947-70E740481C1C}">
+                <a14:useLocalDpi xmlns:a14="http://schemas.microsoft.com/office/drawing/2010/main" val="0"/>
+              </a:ext>
+            </a:extLst>
+          </a:blip>
+          <a:stretch>
+            <a:fillRect/>
+          </a:stretch>
+        </p:blipFill>
+        <p:spPr>
+          <a:xfrm>
+            <a:off x="1523991" y="1243770"/>
+            <a:ext cx="9144018" cy="5486411"/>
+          </a:xfrm>
+          <a:prstGeom prst="rect">
+            <a:avLst/>
+          </a:prstGeom>
+        </p:spPr>
+      </p:pic>
+    </p:spTree>
+    <p:extLst>
+      <p:ext uri="{BB962C8B-B14F-4D97-AF65-F5344CB8AC3E}">
+        <p14:creationId xmlns:p14="http://schemas.microsoft.com/office/powerpoint/2010/main" val="2656696961"/>
+      </p:ext>
+    </p:extLst>
+  </p:cSld>
+  <p:clrMapOvr>
+    <a:masterClrMapping/>
+  </p:clrMapOvr>
+</p:sld>
+</file>
+
 <file path=ppt/slides/slide2.xml><?xml version="1.0" encoding="utf-8"?>
 <p:sld xmlns:a="http://schemas.openxmlformats.org/drawingml/2006/main" xmlns:r="http://schemas.openxmlformats.org/officeDocument/2006/relationships" xmlns:p="http://schemas.openxmlformats.org/presentationml/2006/main">
   <p:cSld>

</xml_diff>